<commit_message>
correção de alguns detalhes
</commit_message>
<xml_diff>
--- a/APRESENTACAO/runPiece.pptx
+++ b/APRESENTACAO/runPiece.pptx
@@ -110,6 +110,11 @@
       </a:defRPr>
     </a:lvl9pPr>
   </p:defaultTextStyle>
+  <p:extLst>
+    <p:ext uri="{EFAFB233-063F-42B5-8137-9DF3F51BA10A}">
+      <p15:sldGuideLst xmlns:p15="http://schemas.microsoft.com/office/powerpoint/2012/main"/>
+    </p:ext>
+  </p:extLst>
 </p:presentation>
 </file>
 
@@ -260,7 +265,7 @@
           <a:p>
             <a:fld id="{41D96E16-DC63-4FBB-B2EF-37847E620C5A}" type="datetimeFigureOut">
               <a:rPr lang="pt-BR" smtClean="0"/>
-              <a:t>06/06/2022</a:t>
+              <a:t>07/06/2022</a:t>
             </a:fld>
             <a:endParaRPr lang="pt-BR"/>
           </a:p>
@@ -458,7 +463,7 @@
           <a:p>
             <a:fld id="{41D96E16-DC63-4FBB-B2EF-37847E620C5A}" type="datetimeFigureOut">
               <a:rPr lang="pt-BR" smtClean="0"/>
-              <a:t>06/06/2022</a:t>
+              <a:t>07/06/2022</a:t>
             </a:fld>
             <a:endParaRPr lang="pt-BR"/>
           </a:p>
@@ -666,7 +671,7 @@
           <a:p>
             <a:fld id="{41D96E16-DC63-4FBB-B2EF-37847E620C5A}" type="datetimeFigureOut">
               <a:rPr lang="pt-BR" smtClean="0"/>
-              <a:t>06/06/2022</a:t>
+              <a:t>07/06/2022</a:t>
             </a:fld>
             <a:endParaRPr lang="pt-BR"/>
           </a:p>
@@ -864,7 +869,7 @@
           <a:p>
             <a:fld id="{41D96E16-DC63-4FBB-B2EF-37847E620C5A}" type="datetimeFigureOut">
               <a:rPr lang="pt-BR" smtClean="0"/>
-              <a:t>06/06/2022</a:t>
+              <a:t>07/06/2022</a:t>
             </a:fld>
             <a:endParaRPr lang="pt-BR"/>
           </a:p>
@@ -1139,7 +1144,7 @@
           <a:p>
             <a:fld id="{41D96E16-DC63-4FBB-B2EF-37847E620C5A}" type="datetimeFigureOut">
               <a:rPr lang="pt-BR" smtClean="0"/>
-              <a:t>06/06/2022</a:t>
+              <a:t>07/06/2022</a:t>
             </a:fld>
             <a:endParaRPr lang="pt-BR"/>
           </a:p>
@@ -1404,7 +1409,7 @@
           <a:p>
             <a:fld id="{41D96E16-DC63-4FBB-B2EF-37847E620C5A}" type="datetimeFigureOut">
               <a:rPr lang="pt-BR" smtClean="0"/>
-              <a:t>06/06/2022</a:t>
+              <a:t>07/06/2022</a:t>
             </a:fld>
             <a:endParaRPr lang="pt-BR"/>
           </a:p>
@@ -1816,7 +1821,7 @@
           <a:p>
             <a:fld id="{41D96E16-DC63-4FBB-B2EF-37847E620C5A}" type="datetimeFigureOut">
               <a:rPr lang="pt-BR" smtClean="0"/>
-              <a:t>06/06/2022</a:t>
+              <a:t>07/06/2022</a:t>
             </a:fld>
             <a:endParaRPr lang="pt-BR"/>
           </a:p>
@@ -1957,7 +1962,7 @@
           <a:p>
             <a:fld id="{41D96E16-DC63-4FBB-B2EF-37847E620C5A}" type="datetimeFigureOut">
               <a:rPr lang="pt-BR" smtClean="0"/>
-              <a:t>06/06/2022</a:t>
+              <a:t>07/06/2022</a:t>
             </a:fld>
             <a:endParaRPr lang="pt-BR"/>
           </a:p>
@@ -2070,7 +2075,7 @@
           <a:p>
             <a:fld id="{41D96E16-DC63-4FBB-B2EF-37847E620C5A}" type="datetimeFigureOut">
               <a:rPr lang="pt-BR" smtClean="0"/>
-              <a:t>06/06/2022</a:t>
+              <a:t>07/06/2022</a:t>
             </a:fld>
             <a:endParaRPr lang="pt-BR"/>
           </a:p>
@@ -2381,7 +2386,7 @@
           <a:p>
             <a:fld id="{41D96E16-DC63-4FBB-B2EF-37847E620C5A}" type="datetimeFigureOut">
               <a:rPr lang="pt-BR" smtClean="0"/>
-              <a:t>06/06/2022</a:t>
+              <a:t>07/06/2022</a:t>
             </a:fld>
             <a:endParaRPr lang="pt-BR"/>
           </a:p>
@@ -2669,7 +2674,7 @@
           <a:p>
             <a:fld id="{41D96E16-DC63-4FBB-B2EF-37847E620C5A}" type="datetimeFigureOut">
               <a:rPr lang="pt-BR" smtClean="0"/>
-              <a:t>06/06/2022</a:t>
+              <a:t>07/06/2022</a:t>
             </a:fld>
             <a:endParaRPr lang="pt-BR"/>
           </a:p>
@@ -2910,7 +2915,7 @@
           <a:p>
             <a:fld id="{41D96E16-DC63-4FBB-B2EF-37847E620C5A}" type="datetimeFigureOut">
               <a:rPr lang="pt-BR" smtClean="0"/>
-              <a:t>06/06/2022</a:t>
+              <a:t>07/06/2022</a:t>
             </a:fld>
             <a:endParaRPr lang="pt-BR"/>
           </a:p>
@@ -3878,13 +3883,13 @@
   <p:clrMapOvr>
     <a:masterClrMapping/>
   </p:clrMapOvr>
-  <mc:AlternateContent xmlns:mc="http://schemas.openxmlformats.org/markup-compatibility/2006">
-    <mc:Choice xmlns:p159="http://schemas.microsoft.com/office/powerpoint/2015/09/main" Requires="p159">
+  <mc:AlternateContent xmlns:mc="http://schemas.openxmlformats.org/markup-compatibility/2006" xmlns:p159="http://schemas.microsoft.com/office/powerpoint/2015/09/main">
+    <mc:Choice Requires="p159">
       <p:transition xmlns:p14="http://schemas.microsoft.com/office/powerpoint/2010/main" spd="slow" p14:dur="2000">
         <p159:morph option="byObject"/>
       </p:transition>
     </mc:Choice>
-    <mc:Fallback>
+    <mc:Fallback xmlns="">
       <p:transition spd="slow">
         <p:fade/>
       </p:transition>
@@ -4204,6 +4209,42 @@
           </a:prstGeom>
         </p:spPr>
       </p:pic>
+      <p:pic>
+        <p:nvPicPr>
+          <p:cNvPr id="10" name="Imagem 9" descr="Imagem digital fictícia de personagem de desenho animado&#10;&#10;Descrição gerada automaticamente com confiança baixa">
+            <a:extLst>
+              <a:ext uri="{FF2B5EF4-FFF2-40B4-BE49-F238E27FC236}">
+                <a16:creationId xmlns:a16="http://schemas.microsoft.com/office/drawing/2014/main" id="{83583A49-F314-2604-3DBA-B3D25D62A6AB}"/>
+              </a:ext>
+            </a:extLst>
+          </p:cNvPr>
+          <p:cNvPicPr>
+            <a:picLocks noChangeAspect="1"/>
+          </p:cNvPicPr>
+          <p:nvPr/>
+        </p:nvPicPr>
+        <p:blipFill>
+          <a:blip r:embed="rId5">
+            <a:extLst>
+              <a:ext uri="{28A0092B-C50C-407E-A947-70E740481C1C}">
+                <a14:useLocalDpi xmlns:a14="http://schemas.microsoft.com/office/drawing/2010/main" val="0"/>
+              </a:ext>
+            </a:extLst>
+          </a:blip>
+          <a:stretch>
+            <a:fillRect/>
+          </a:stretch>
+        </p:blipFill>
+        <p:spPr>
+          <a:xfrm>
+            <a:off x="5181896" y="7150297"/>
+            <a:ext cx="1822510" cy="2213048"/>
+          </a:xfrm>
+          <a:prstGeom prst="rect">
+            <a:avLst/>
+          </a:prstGeom>
+        </p:spPr>
+      </p:pic>
     </p:spTree>
     <p:extLst>
       <p:ext uri="{BB962C8B-B14F-4D97-AF65-F5344CB8AC3E}">
@@ -4214,13 +4255,13 @@
   <p:clrMapOvr>
     <a:masterClrMapping/>
   </p:clrMapOvr>
-  <mc:AlternateContent xmlns:mc="http://schemas.openxmlformats.org/markup-compatibility/2006">
-    <mc:Choice xmlns:p159="http://schemas.microsoft.com/office/powerpoint/2015/09/main" Requires="p159">
+  <mc:AlternateContent xmlns:mc="http://schemas.openxmlformats.org/markup-compatibility/2006" xmlns:p159="http://schemas.microsoft.com/office/powerpoint/2015/09/main">
+    <mc:Choice Requires="p159">
       <p:transition xmlns:p14="http://schemas.microsoft.com/office/powerpoint/2010/main" spd="slow" p14:dur="2000">
         <p159:morph option="byObject"/>
       </p:transition>
     </mc:Choice>
-    <mc:Fallback>
+    <mc:Fallback xmlns="">
       <p:transition spd="slow">
         <p:fade/>
       </p:transition>
@@ -4615,6 +4656,42 @@
           </a:prstGeom>
         </p:spPr>
       </p:pic>
+      <p:pic>
+        <p:nvPicPr>
+          <p:cNvPr id="6" name="Imagem 5" descr="Imagem digital fictícia de personagem de desenho animado&#10;&#10;Descrição gerada automaticamente com confiança baixa">
+            <a:extLst>
+              <a:ext uri="{FF2B5EF4-FFF2-40B4-BE49-F238E27FC236}">
+                <a16:creationId xmlns:a16="http://schemas.microsoft.com/office/drawing/2014/main" id="{6235AEAA-585E-4E96-E4A9-64E30E30E4E3}"/>
+              </a:ext>
+            </a:extLst>
+          </p:cNvPr>
+          <p:cNvPicPr>
+            <a:picLocks noChangeAspect="1"/>
+          </p:cNvPicPr>
+          <p:nvPr/>
+        </p:nvPicPr>
+        <p:blipFill>
+          <a:blip r:embed="rId5">
+            <a:extLst>
+              <a:ext uri="{28A0092B-C50C-407E-A947-70E740481C1C}">
+                <a14:useLocalDpi xmlns:a14="http://schemas.microsoft.com/office/drawing/2010/main" val="0"/>
+              </a:ext>
+            </a:extLst>
+          </a:blip>
+          <a:stretch>
+            <a:fillRect/>
+          </a:stretch>
+        </p:blipFill>
+        <p:spPr>
+          <a:xfrm>
+            <a:off x="5217064" y="4644951"/>
+            <a:ext cx="1822510" cy="2213048"/>
+          </a:xfrm>
+          <a:prstGeom prst="rect">
+            <a:avLst/>
+          </a:prstGeom>
+        </p:spPr>
+      </p:pic>
     </p:spTree>
     <p:extLst>
       <p:ext uri="{BB962C8B-B14F-4D97-AF65-F5344CB8AC3E}">
@@ -4625,13 +4702,13 @@
   <p:clrMapOvr>
     <a:masterClrMapping/>
   </p:clrMapOvr>
-  <mc:AlternateContent xmlns:mc="http://schemas.openxmlformats.org/markup-compatibility/2006">
-    <mc:Choice xmlns:p159="http://schemas.microsoft.com/office/powerpoint/2015/09/main" Requires="p159">
+  <mc:AlternateContent xmlns:mc="http://schemas.openxmlformats.org/markup-compatibility/2006" xmlns:p159="http://schemas.microsoft.com/office/powerpoint/2015/09/main">
+    <mc:Choice Requires="p159">
       <p:transition xmlns:p14="http://schemas.microsoft.com/office/powerpoint/2010/main" spd="slow" p14:dur="2000">
         <p159:morph option="byObject"/>
       </p:transition>
     </mc:Choice>
-    <mc:Fallback>
+    <mc:Fallback xmlns="">
       <p:transition spd="slow">
         <p:fade/>
       </p:transition>
@@ -4701,6 +4778,97 @@
                       </p:childTnLst>
                     </p:cTn>
                   </p:par>
+                  <p:par>
+                    <p:cTn id="8" fill="hold">
+                      <p:stCondLst>
+                        <p:cond delay="indefinite"/>
+                      </p:stCondLst>
+                      <p:childTnLst>
+                        <p:par>
+                          <p:cTn id="9" fill="hold">
+                            <p:stCondLst>
+                              <p:cond delay="0"/>
+                            </p:stCondLst>
+                            <p:childTnLst>
+                              <p:par>
+                                <p:cTn id="10" presetID="2" presetClass="entr" presetSubtype="4" fill="hold" nodeType="clickEffect">
+                                  <p:stCondLst>
+                                    <p:cond delay="0"/>
+                                  </p:stCondLst>
+                                  <p:childTnLst>
+                                    <p:set>
+                                      <p:cBhvr>
+                                        <p:cTn id="11" dur="1" fill="hold">
+                                          <p:stCondLst>
+                                            <p:cond delay="0"/>
+                                          </p:stCondLst>
+                                        </p:cTn>
+                                        <p:tgtEl>
+                                          <p:spTgt spid="6"/>
+                                        </p:tgtEl>
+                                        <p:attrNameLst>
+                                          <p:attrName>style.visibility</p:attrName>
+                                        </p:attrNameLst>
+                                      </p:cBhvr>
+                                      <p:to>
+                                        <p:strVal val="visible"/>
+                                      </p:to>
+                                    </p:set>
+                                    <p:anim calcmode="lin" valueType="num">
+                                      <p:cBhvr additive="base">
+                                        <p:cTn id="12" dur="500" fill="hold"/>
+                                        <p:tgtEl>
+                                          <p:spTgt spid="6"/>
+                                        </p:tgtEl>
+                                        <p:attrNameLst>
+                                          <p:attrName>ppt_x</p:attrName>
+                                        </p:attrNameLst>
+                                      </p:cBhvr>
+                                      <p:tavLst>
+                                        <p:tav tm="0">
+                                          <p:val>
+                                            <p:strVal val="#ppt_x"/>
+                                          </p:val>
+                                        </p:tav>
+                                        <p:tav tm="100000">
+                                          <p:val>
+                                            <p:strVal val="#ppt_x"/>
+                                          </p:val>
+                                        </p:tav>
+                                      </p:tavLst>
+                                    </p:anim>
+                                    <p:anim calcmode="lin" valueType="num">
+                                      <p:cBhvr additive="base">
+                                        <p:cTn id="13" dur="500" fill="hold"/>
+                                        <p:tgtEl>
+                                          <p:spTgt spid="6"/>
+                                        </p:tgtEl>
+                                        <p:attrNameLst>
+                                          <p:attrName>ppt_y</p:attrName>
+                                        </p:attrNameLst>
+                                      </p:cBhvr>
+                                      <p:tavLst>
+                                        <p:tav tm="0">
+                                          <p:val>
+                                            <p:strVal val="1+#ppt_h/2"/>
+                                          </p:val>
+                                        </p:tav>
+                                        <p:tav tm="100000">
+                                          <p:val>
+                                            <p:strVal val="#ppt_y"/>
+                                          </p:val>
+                                        </p:tav>
+                                      </p:tavLst>
+                                    </p:anim>
+                                  </p:childTnLst>
+                                </p:cTn>
+                              </p:par>
+                            </p:childTnLst>
+                          </p:cTn>
+                        </p:par>
+                      </p:childTnLst>
+                    </p:cTn>
+                  </p:par>
                 </p:childTnLst>
               </p:cTn>
               <p:prevCondLst>
@@ -4991,13 +5159,13 @@
   <p:clrMapOvr>
     <a:masterClrMapping/>
   </p:clrMapOvr>
-  <mc:AlternateContent xmlns:mc="http://schemas.openxmlformats.org/markup-compatibility/2006">
-    <mc:Choice xmlns:p159="http://schemas.microsoft.com/office/powerpoint/2015/09/main" Requires="p159">
+  <mc:AlternateContent xmlns:mc="http://schemas.openxmlformats.org/markup-compatibility/2006" xmlns:p159="http://schemas.microsoft.com/office/powerpoint/2015/09/main">
+    <mc:Choice Requires="p159">
       <p:transition xmlns:p14="http://schemas.microsoft.com/office/powerpoint/2010/main" spd="slow" p14:dur="2000">
         <p159:morph option="byObject"/>
       </p:transition>
     </mc:Choice>
-    <mc:Fallback>
+    <mc:Fallback xmlns="">
       <p:transition spd="slow">
         <p:fade/>
       </p:transition>
@@ -5370,13 +5538,13 @@
   <p:clrMapOvr>
     <a:masterClrMapping/>
   </p:clrMapOvr>
-  <mc:AlternateContent xmlns:mc="http://schemas.openxmlformats.org/markup-compatibility/2006">
-    <mc:Choice xmlns:p159="http://schemas.microsoft.com/office/powerpoint/2015/09/main" Requires="p159">
+  <mc:AlternateContent xmlns:mc="http://schemas.openxmlformats.org/markup-compatibility/2006" xmlns:p159="http://schemas.microsoft.com/office/powerpoint/2015/09/main">
+    <mc:Choice Requires="p159">
       <p:transition xmlns:p14="http://schemas.microsoft.com/office/powerpoint/2010/main" spd="slow" p14:dur="2000">
         <p159:morph option="byObject"/>
       </p:transition>
     </mc:Choice>
-    <mc:Fallback>
+    <mc:Fallback xmlns="">
       <p:transition spd="slow">
         <p:fade/>
       </p:transition>
@@ -5736,13 +5904,13 @@
   <p:clrMapOvr>
     <a:masterClrMapping/>
   </p:clrMapOvr>
-  <mc:AlternateContent xmlns:mc="http://schemas.openxmlformats.org/markup-compatibility/2006">
-    <mc:Choice xmlns:p159="http://schemas.microsoft.com/office/powerpoint/2015/09/main" Requires="p159">
+  <mc:AlternateContent xmlns:mc="http://schemas.openxmlformats.org/markup-compatibility/2006" xmlns:p159="http://schemas.microsoft.com/office/powerpoint/2015/09/main">
+    <mc:Choice Requires="p159">
       <p:transition xmlns:p14="http://schemas.microsoft.com/office/powerpoint/2010/main" spd="slow" p14:dur="2000">
         <p159:morph option="byObject"/>
       </p:transition>
     </mc:Choice>
-    <mc:Fallback>
+    <mc:Fallback xmlns="">
       <p:transition spd="slow">
         <p:fade/>
       </p:transition>
@@ -6321,18 +6489,18 @@
 </file>
 
 <file path=customXml/item2.xml><?xml version="1.0" encoding="utf-8"?>
+<p:properties xmlns:p="http://schemas.microsoft.com/office/2006/metadata/properties" xmlns:xsi="http://www.w3.org/2001/XMLSchema-instance" xmlns:pc="http://schemas.microsoft.com/office/infopath/2007/PartnerControls">
+  <documentManagement/>
+</p:properties>
+</file>
+
+<file path=customXml/item3.xml><?xml version="1.0" encoding="utf-8"?>
 <?mso-contentType ?>
 <FormTemplates xmlns="http://schemas.microsoft.com/sharepoint/v3/contenttype/forms">
   <Display>DocumentLibraryForm</Display>
   <Edit>DocumentLibraryForm</Edit>
   <New>DocumentLibraryForm</New>
 </FormTemplates>
-</file>
-
-<file path=customXml/item3.xml><?xml version="1.0" encoding="utf-8"?>
-<p:properties xmlns:p="http://schemas.microsoft.com/office/2006/metadata/properties" xmlns:xsi="http://www.w3.org/2001/XMLSchema-instance" xmlns:pc="http://schemas.microsoft.com/office/infopath/2007/PartnerControls">
-  <documentManagement/>
-</p:properties>
 </file>
 
 <file path=customXml/itemProps1.xml><?xml version="1.0" encoding="utf-8"?>
@@ -6355,14 +6523,6 @@
 </file>
 
 <file path=customXml/itemProps2.xml><?xml version="1.0" encoding="utf-8"?>
-<ds:datastoreItem xmlns:ds="http://schemas.openxmlformats.org/officeDocument/2006/customXml" ds:itemID="{22702509-CDA9-47A6-B94F-9CAD3936A084}">
-  <ds:schemaRefs>
-    <ds:schemaRef ds:uri="http://schemas.microsoft.com/sharepoint/v3/contenttype/forms"/>
-  </ds:schemaRefs>
-</ds:datastoreItem>
-</file>
-
-<file path=customXml/itemProps3.xml><?xml version="1.0" encoding="utf-8"?>
 <ds:datastoreItem xmlns:ds="http://schemas.openxmlformats.org/officeDocument/2006/customXml" ds:itemID="{57AE8FB0-F977-470C-8D89-CAC7746A3FE2}">
   <ds:schemaRefs>
     <ds:schemaRef ds:uri="http://schemas.microsoft.com/office/2006/documentManagement/types"/>
@@ -6377,4 +6537,12 @@
     <ds:schemaRef ds:uri="http://purl.org/dc/dcmitype/"/>
   </ds:schemaRefs>
 </ds:datastoreItem>
+</file>
+
+<file path=customXml/itemProps3.xml><?xml version="1.0" encoding="utf-8"?>
+<ds:datastoreItem xmlns:ds="http://schemas.openxmlformats.org/officeDocument/2006/customXml" ds:itemID="{22702509-CDA9-47A6-B94F-9CAD3936A084}">
+  <ds:schemaRefs>
+    <ds:schemaRef ds:uri="http://schemas.microsoft.com/sharepoint/v3/contenttype/forms"/>
+  </ds:schemaRefs>
+</ds:datastoreItem>
 </file>
</xml_diff>